<commit_message>
Update paper, thesis, references
</commit_message>
<xml_diff>
--- a/References/huy_draft.pptx
+++ b/References/huy_draft.pptx
@@ -262,7 +262,7 @@
           <a:p>
             <a:fld id="{F46336BD-2A7D-4CB1-A425-EDBB44797913}" type="datetimeFigureOut">
               <a:rPr lang="en-US" smtClean="0"/>
-              <a:t>9/22/2020</a:t>
+              <a:t>9/29/2020</a:t>
             </a:fld>
             <a:endParaRPr lang="en-US"/>
           </a:p>
@@ -460,7 +460,7 @@
           <a:p>
             <a:fld id="{F46336BD-2A7D-4CB1-A425-EDBB44797913}" type="datetimeFigureOut">
               <a:rPr lang="en-US" smtClean="0"/>
-              <a:t>9/22/2020</a:t>
+              <a:t>9/29/2020</a:t>
             </a:fld>
             <a:endParaRPr lang="en-US"/>
           </a:p>
@@ -668,7 +668,7 @@
           <a:p>
             <a:fld id="{F46336BD-2A7D-4CB1-A425-EDBB44797913}" type="datetimeFigureOut">
               <a:rPr lang="en-US" smtClean="0"/>
-              <a:t>9/22/2020</a:t>
+              <a:t>9/29/2020</a:t>
             </a:fld>
             <a:endParaRPr lang="en-US"/>
           </a:p>
@@ -866,7 +866,7 @@
           <a:p>
             <a:fld id="{F46336BD-2A7D-4CB1-A425-EDBB44797913}" type="datetimeFigureOut">
               <a:rPr lang="en-US" smtClean="0"/>
-              <a:t>9/22/2020</a:t>
+              <a:t>9/29/2020</a:t>
             </a:fld>
             <a:endParaRPr lang="en-US"/>
           </a:p>
@@ -1141,7 +1141,7 @@
           <a:p>
             <a:fld id="{F46336BD-2A7D-4CB1-A425-EDBB44797913}" type="datetimeFigureOut">
               <a:rPr lang="en-US" smtClean="0"/>
-              <a:t>9/22/2020</a:t>
+              <a:t>9/29/2020</a:t>
             </a:fld>
             <a:endParaRPr lang="en-US"/>
           </a:p>
@@ -1406,7 +1406,7 @@
           <a:p>
             <a:fld id="{F46336BD-2A7D-4CB1-A425-EDBB44797913}" type="datetimeFigureOut">
               <a:rPr lang="en-US" smtClean="0"/>
-              <a:t>9/22/2020</a:t>
+              <a:t>9/29/2020</a:t>
             </a:fld>
             <a:endParaRPr lang="en-US"/>
           </a:p>
@@ -1818,7 +1818,7 @@
           <a:p>
             <a:fld id="{F46336BD-2A7D-4CB1-A425-EDBB44797913}" type="datetimeFigureOut">
               <a:rPr lang="en-US" smtClean="0"/>
-              <a:t>9/22/2020</a:t>
+              <a:t>9/29/2020</a:t>
             </a:fld>
             <a:endParaRPr lang="en-US"/>
           </a:p>
@@ -1959,7 +1959,7 @@
           <a:p>
             <a:fld id="{F46336BD-2A7D-4CB1-A425-EDBB44797913}" type="datetimeFigureOut">
               <a:rPr lang="en-US" smtClean="0"/>
-              <a:t>9/22/2020</a:t>
+              <a:t>9/29/2020</a:t>
             </a:fld>
             <a:endParaRPr lang="en-US"/>
           </a:p>
@@ -2072,7 +2072,7 @@
           <a:p>
             <a:fld id="{F46336BD-2A7D-4CB1-A425-EDBB44797913}" type="datetimeFigureOut">
               <a:rPr lang="en-US" smtClean="0"/>
-              <a:t>9/22/2020</a:t>
+              <a:t>9/29/2020</a:t>
             </a:fld>
             <a:endParaRPr lang="en-US"/>
           </a:p>
@@ -2383,7 +2383,7 @@
           <a:p>
             <a:fld id="{F46336BD-2A7D-4CB1-A425-EDBB44797913}" type="datetimeFigureOut">
               <a:rPr lang="en-US" smtClean="0"/>
-              <a:t>9/22/2020</a:t>
+              <a:t>9/29/2020</a:t>
             </a:fld>
             <a:endParaRPr lang="en-US"/>
           </a:p>
@@ -2671,7 +2671,7 @@
           <a:p>
             <a:fld id="{F46336BD-2A7D-4CB1-A425-EDBB44797913}" type="datetimeFigureOut">
               <a:rPr lang="en-US" smtClean="0"/>
-              <a:t>9/22/2020</a:t>
+              <a:t>9/29/2020</a:t>
             </a:fld>
             <a:endParaRPr lang="en-US"/>
           </a:p>
@@ -2912,7 +2912,7 @@
           <a:p>
             <a:fld id="{F46336BD-2A7D-4CB1-A425-EDBB44797913}" type="datetimeFigureOut">
               <a:rPr lang="en-US" smtClean="0"/>
-              <a:t>9/22/2020</a:t>
+              <a:t>9/29/2020</a:t>
             </a:fld>
             <a:endParaRPr lang="en-US"/>
           </a:p>
@@ -3454,7 +3454,7 @@
             </a:solidFill>
             <a:ln w="57150">
               <a:solidFill>
-                <a:srgbClr val="FF0000"/>
+                <a:schemeClr val="tx1"/>
               </a:solidFill>
             </a:ln>
           </p:spPr>

</xml_diff>